<commit_message>
adding level 2 map
</commit_message>
<xml_diff>
--- a/level3.pptx
+++ b/level3.pptx
@@ -6,6 +6,7 @@
   </p:sldMasterIdLst>
   <p:sldIdLst>
     <p:sldId id="256" r:id="rId2"/>
+    <p:sldId id="257" r:id="rId3"/>
   </p:sldIdLst>
   <p:sldSz cx="9144000" cy="6858000" type="screen4x3"/>
   <p:notesSz cx="6858000" cy="9144000"/>
@@ -3323,97 +3324,6 @@
       </p:grpSp>
       <p:grpSp>
         <p:nvGrpSpPr>
-          <p:cNvPr id="11" name="Group 10"/>
-          <p:cNvGrpSpPr/>
-          <p:nvPr/>
-        </p:nvGrpSpPr>
-        <p:grpSpPr>
-          <a:xfrm>
-            <a:off x="816715" y="3747681"/>
-            <a:ext cx="785619" cy="407780"/>
-            <a:chOff x="7344271" y="3078768"/>
-            <a:chExt cx="547186" cy="516613"/>
-          </a:xfrm>
-        </p:grpSpPr>
-        <p:sp>
-          <p:nvSpPr>
-            <p:cNvPr id="12" name="Rectangle 11"/>
-            <p:cNvSpPr/>
-            <p:nvPr/>
-          </p:nvSpPr>
-          <p:spPr>
-            <a:xfrm>
-              <a:off x="7344271" y="3078768"/>
-              <a:ext cx="547186" cy="516613"/>
-            </a:xfrm>
-            <a:prstGeom prst="rect">
-              <a:avLst/>
-            </a:prstGeom>
-            <a:solidFill>
-              <a:srgbClr val="FFFFFF"/>
-            </a:solidFill>
-            <a:ln>
-              <a:solidFill>
-                <a:srgbClr val="000000"/>
-              </a:solidFill>
-            </a:ln>
-          </p:spPr>
-          <p:style>
-            <a:lnRef idx="1">
-              <a:schemeClr val="accent1"/>
-            </a:lnRef>
-            <a:fillRef idx="3">
-              <a:schemeClr val="accent1"/>
-            </a:fillRef>
-            <a:effectRef idx="2">
-              <a:schemeClr val="accent1"/>
-            </a:effectRef>
-            <a:fontRef idx="minor">
-              <a:schemeClr val="lt1"/>
-            </a:fontRef>
-          </p:style>
-          <p:txBody>
-            <a:bodyPr rtlCol="0" anchor="ctr"/>
-            <a:lstStyle/>
-            <a:p>
-              <a:pPr algn="ctr"/>
-              <a:endParaRPr lang="en-US"/>
-            </a:p>
-          </p:txBody>
-        </p:sp>
-        <p:sp>
-          <p:nvSpPr>
-            <p:cNvPr id="13" name="TextBox 12"/>
-            <p:cNvSpPr txBox="1"/>
-            <p:nvPr/>
-          </p:nvSpPr>
-          <p:spPr>
-            <a:xfrm>
-              <a:off x="7355938" y="3136399"/>
-              <a:ext cx="535519" cy="369332"/>
-            </a:xfrm>
-            <a:prstGeom prst="rect">
-              <a:avLst/>
-            </a:prstGeom>
-            <a:noFill/>
-          </p:spPr>
-          <p:txBody>
-            <a:bodyPr wrap="square" rtlCol="0">
-              <a:spAutoFit/>
-            </a:bodyPr>
-            <a:lstStyle/>
-            <a:p>
-              <a:r>
-                <a:rPr lang="en-US" dirty="0" smtClean="0"/>
-                <a:t>Toilet</a:t>
-              </a:r>
-              <a:endParaRPr lang="en-US" dirty="0"/>
-            </a:p>
-          </p:txBody>
-        </p:sp>
-      </p:grpSp>
-      <p:grpSp>
-        <p:nvGrpSpPr>
           <p:cNvPr id="14" name="Group 13"/>
           <p:cNvGrpSpPr/>
           <p:nvPr/>
@@ -4989,10 +4899,1388 @@
           </a:p>
         </p:txBody>
       </p:sp>
+      <p:grpSp>
+        <p:nvGrpSpPr>
+          <p:cNvPr id="67" name="Group 66"/>
+          <p:cNvGrpSpPr/>
+          <p:nvPr/>
+        </p:nvGrpSpPr>
+        <p:grpSpPr>
+          <a:xfrm>
+            <a:off x="1616104" y="2376528"/>
+            <a:ext cx="1037543" cy="703962"/>
+            <a:chOff x="7344271" y="3078768"/>
+            <a:chExt cx="654291" cy="703962"/>
+          </a:xfrm>
+        </p:grpSpPr>
+        <p:sp>
+          <p:nvSpPr>
+            <p:cNvPr id="68" name="Rectangle 67"/>
+            <p:cNvSpPr/>
+            <p:nvPr/>
+          </p:nvSpPr>
+          <p:spPr>
+            <a:xfrm>
+              <a:off x="7344271" y="3078768"/>
+              <a:ext cx="547186" cy="516613"/>
+            </a:xfrm>
+            <a:prstGeom prst="rect">
+              <a:avLst/>
+            </a:prstGeom>
+            <a:solidFill>
+              <a:srgbClr val="FFFFFF"/>
+            </a:solidFill>
+            <a:ln>
+              <a:solidFill>
+                <a:srgbClr val="000000"/>
+              </a:solidFill>
+            </a:ln>
+          </p:spPr>
+          <p:style>
+            <a:lnRef idx="1">
+              <a:schemeClr val="accent1"/>
+            </a:lnRef>
+            <a:fillRef idx="3">
+              <a:schemeClr val="accent1"/>
+            </a:fillRef>
+            <a:effectRef idx="2">
+              <a:schemeClr val="accent1"/>
+            </a:effectRef>
+            <a:fontRef idx="minor">
+              <a:schemeClr val="lt1"/>
+            </a:fontRef>
+          </p:style>
+          <p:txBody>
+            <a:bodyPr rtlCol="0" anchor="ctr"/>
+            <a:lstStyle/>
+            <a:p>
+              <a:pPr algn="ctr"/>
+              <a:endParaRPr lang="en-US"/>
+            </a:p>
+          </p:txBody>
+        </p:sp>
+        <p:sp>
+          <p:nvSpPr>
+            <p:cNvPr id="69" name="TextBox 68"/>
+            <p:cNvSpPr txBox="1"/>
+            <p:nvPr/>
+          </p:nvSpPr>
+          <p:spPr>
+            <a:xfrm>
+              <a:off x="7355938" y="3136399"/>
+              <a:ext cx="642624" cy="646331"/>
+            </a:xfrm>
+            <a:prstGeom prst="rect">
+              <a:avLst/>
+            </a:prstGeom>
+            <a:noFill/>
+          </p:spPr>
+          <p:txBody>
+            <a:bodyPr wrap="square" rtlCol="0">
+              <a:spAutoFit/>
+            </a:bodyPr>
+            <a:lstStyle/>
+            <a:p>
+              <a:r>
+                <a:rPr lang="en-US" dirty="0" smtClean="0"/>
+                <a:t>stairs</a:t>
+              </a:r>
+              <a:endParaRPr lang="en-US" dirty="0"/>
+            </a:p>
+          </p:txBody>
+        </p:sp>
+      </p:grpSp>
     </p:spTree>
     <p:extLst>
       <p:ext uri="{BB962C8B-B14F-4D97-AF65-F5344CB8AC3E}">
         <p14:creationId xmlns:p14="http://schemas.microsoft.com/office/powerpoint/2010/main" val="1778241503"/>
+      </p:ext>
+    </p:extLst>
+  </p:cSld>
+  <p:clrMapOvr>
+    <a:masterClrMapping/>
+  </p:clrMapOvr>
+</p:sld>
+</file>
+
+<file path=ppt/slides/slide2.xml><?xml version="1.0" encoding="utf-8"?>
+<p:sld xmlns:a="http://schemas.openxmlformats.org/drawingml/2006/main" xmlns:r="http://schemas.openxmlformats.org/officeDocument/2006/relationships" xmlns:p="http://schemas.openxmlformats.org/presentationml/2006/main">
+  <p:cSld>
+    <p:spTree>
+      <p:nvGrpSpPr>
+        <p:cNvPr id="1" name=""/>
+        <p:cNvGrpSpPr/>
+        <p:nvPr/>
+      </p:nvGrpSpPr>
+      <p:grpSpPr>
+        <a:xfrm>
+          <a:off x="0" y="0"/>
+          <a:ext cx="0" cy="0"/>
+          <a:chOff x="0" y="0"/>
+          <a:chExt cx="0" cy="0"/>
+        </a:xfrm>
+      </p:grpSpPr>
+      <p:sp>
+        <p:nvSpPr>
+          <p:cNvPr id="4" name="Rectangle 3"/>
+          <p:cNvSpPr/>
+          <p:nvPr/>
+        </p:nvSpPr>
+        <p:spPr>
+          <a:xfrm>
+            <a:off x="646514" y="1728843"/>
+            <a:ext cx="7849190" cy="3105798"/>
+          </a:xfrm>
+          <a:prstGeom prst="rect">
+            <a:avLst/>
+          </a:prstGeom>
+          <a:noFill/>
+          <a:ln>
+            <a:solidFill>
+              <a:schemeClr val="tx1"/>
+            </a:solidFill>
+          </a:ln>
+        </p:spPr>
+        <p:style>
+          <a:lnRef idx="1">
+            <a:schemeClr val="accent1"/>
+          </a:lnRef>
+          <a:fillRef idx="3">
+            <a:schemeClr val="accent1"/>
+          </a:fillRef>
+          <a:effectRef idx="2">
+            <a:schemeClr val="accent1"/>
+          </a:effectRef>
+          <a:fontRef idx="minor">
+            <a:schemeClr val="lt1"/>
+          </a:fontRef>
+        </p:style>
+        <p:txBody>
+          <a:bodyPr rtlCol="0" anchor="ctr"/>
+          <a:lstStyle/>
+          <a:p>
+            <a:pPr algn="ctr"/>
+            <a:endParaRPr lang="en-US"/>
+          </a:p>
+        </p:txBody>
+      </p:sp>
+      <p:grpSp>
+        <p:nvGrpSpPr>
+          <p:cNvPr id="7" name="Group 6"/>
+          <p:cNvGrpSpPr/>
+          <p:nvPr/>
+        </p:nvGrpSpPr>
+        <p:grpSpPr>
+          <a:xfrm>
+            <a:off x="7818602" y="3078768"/>
+            <a:ext cx="654291" cy="516613"/>
+            <a:chOff x="7344271" y="3078768"/>
+            <a:chExt cx="654291" cy="516613"/>
+          </a:xfrm>
+        </p:grpSpPr>
+        <p:sp>
+          <p:nvSpPr>
+            <p:cNvPr id="5" name="Rectangle 4"/>
+            <p:cNvSpPr/>
+            <p:nvPr/>
+          </p:nvSpPr>
+          <p:spPr>
+            <a:xfrm>
+              <a:off x="7344271" y="3078768"/>
+              <a:ext cx="547186" cy="516613"/>
+            </a:xfrm>
+            <a:prstGeom prst="rect">
+              <a:avLst/>
+            </a:prstGeom>
+            <a:solidFill>
+              <a:srgbClr val="FFFFFF"/>
+            </a:solidFill>
+            <a:ln>
+              <a:solidFill>
+                <a:srgbClr val="000000"/>
+              </a:solidFill>
+            </a:ln>
+          </p:spPr>
+          <p:style>
+            <a:lnRef idx="1">
+              <a:schemeClr val="accent1"/>
+            </a:lnRef>
+            <a:fillRef idx="3">
+              <a:schemeClr val="accent1"/>
+            </a:fillRef>
+            <a:effectRef idx="2">
+              <a:schemeClr val="accent1"/>
+            </a:effectRef>
+            <a:fontRef idx="minor">
+              <a:schemeClr val="lt1"/>
+            </a:fontRef>
+          </p:style>
+          <p:txBody>
+            <a:bodyPr rtlCol="0" anchor="ctr"/>
+            <a:lstStyle/>
+            <a:p>
+              <a:pPr algn="ctr"/>
+              <a:endParaRPr lang="en-US"/>
+            </a:p>
+          </p:txBody>
+        </p:sp>
+        <p:sp>
+          <p:nvSpPr>
+            <p:cNvPr id="6" name="TextBox 5"/>
+            <p:cNvSpPr txBox="1"/>
+            <p:nvPr/>
+          </p:nvSpPr>
+          <p:spPr>
+            <a:xfrm>
+              <a:off x="7355938" y="3136399"/>
+              <a:ext cx="642624" cy="369332"/>
+            </a:xfrm>
+            <a:prstGeom prst="rect">
+              <a:avLst/>
+            </a:prstGeom>
+            <a:noFill/>
+          </p:spPr>
+          <p:txBody>
+            <a:bodyPr wrap="square" rtlCol="0">
+              <a:spAutoFit/>
+            </a:bodyPr>
+            <a:lstStyle/>
+            <a:p>
+              <a:r>
+                <a:rPr lang="en-US" dirty="0" smtClean="0"/>
+                <a:t>Lift</a:t>
+              </a:r>
+              <a:endParaRPr lang="en-US" dirty="0"/>
+            </a:p>
+          </p:txBody>
+        </p:sp>
+      </p:grpSp>
+      <p:grpSp>
+        <p:nvGrpSpPr>
+          <p:cNvPr id="8" name="Group 7"/>
+          <p:cNvGrpSpPr/>
+          <p:nvPr/>
+        </p:nvGrpSpPr>
+        <p:grpSpPr>
+          <a:xfrm>
+            <a:off x="4092163" y="2695751"/>
+            <a:ext cx="654291" cy="516613"/>
+            <a:chOff x="7344271" y="3078768"/>
+            <a:chExt cx="654291" cy="516613"/>
+          </a:xfrm>
+        </p:grpSpPr>
+        <p:sp>
+          <p:nvSpPr>
+            <p:cNvPr id="9" name="Rectangle 8"/>
+            <p:cNvSpPr/>
+            <p:nvPr/>
+          </p:nvSpPr>
+          <p:spPr>
+            <a:xfrm>
+              <a:off x="7344271" y="3078768"/>
+              <a:ext cx="547186" cy="516613"/>
+            </a:xfrm>
+            <a:prstGeom prst="rect">
+              <a:avLst/>
+            </a:prstGeom>
+            <a:solidFill>
+              <a:srgbClr val="FFFFFF"/>
+            </a:solidFill>
+            <a:ln>
+              <a:solidFill>
+                <a:srgbClr val="000000"/>
+              </a:solidFill>
+            </a:ln>
+          </p:spPr>
+          <p:style>
+            <a:lnRef idx="1">
+              <a:schemeClr val="accent1"/>
+            </a:lnRef>
+            <a:fillRef idx="3">
+              <a:schemeClr val="accent1"/>
+            </a:fillRef>
+            <a:effectRef idx="2">
+              <a:schemeClr val="accent1"/>
+            </a:effectRef>
+            <a:fontRef idx="minor">
+              <a:schemeClr val="lt1"/>
+            </a:fontRef>
+          </p:style>
+          <p:txBody>
+            <a:bodyPr rtlCol="0" anchor="ctr"/>
+            <a:lstStyle/>
+            <a:p>
+              <a:pPr algn="ctr"/>
+              <a:endParaRPr lang="en-US"/>
+            </a:p>
+          </p:txBody>
+        </p:sp>
+        <p:sp>
+          <p:nvSpPr>
+            <p:cNvPr id="10" name="TextBox 9"/>
+            <p:cNvSpPr txBox="1"/>
+            <p:nvPr/>
+          </p:nvSpPr>
+          <p:spPr>
+            <a:xfrm>
+              <a:off x="7355938" y="3136399"/>
+              <a:ext cx="642624" cy="369332"/>
+            </a:xfrm>
+            <a:prstGeom prst="rect">
+              <a:avLst/>
+            </a:prstGeom>
+            <a:noFill/>
+          </p:spPr>
+          <p:txBody>
+            <a:bodyPr wrap="square" rtlCol="0">
+              <a:spAutoFit/>
+            </a:bodyPr>
+            <a:lstStyle/>
+            <a:p>
+              <a:r>
+                <a:rPr lang="en-US" dirty="0" smtClean="0"/>
+                <a:t>Lift</a:t>
+              </a:r>
+              <a:endParaRPr lang="en-US" dirty="0"/>
+            </a:p>
+          </p:txBody>
+        </p:sp>
+      </p:grpSp>
+      <p:grpSp>
+        <p:nvGrpSpPr>
+          <p:cNvPr id="11" name="Group 10"/>
+          <p:cNvGrpSpPr/>
+          <p:nvPr/>
+        </p:nvGrpSpPr>
+        <p:grpSpPr>
+          <a:xfrm>
+            <a:off x="4103830" y="3385391"/>
+            <a:ext cx="785619" cy="407780"/>
+            <a:chOff x="7344271" y="3078768"/>
+            <a:chExt cx="547186" cy="516613"/>
+          </a:xfrm>
+        </p:grpSpPr>
+        <p:sp>
+          <p:nvSpPr>
+            <p:cNvPr id="12" name="Rectangle 11"/>
+            <p:cNvSpPr/>
+            <p:nvPr/>
+          </p:nvSpPr>
+          <p:spPr>
+            <a:xfrm>
+              <a:off x="7344271" y="3078768"/>
+              <a:ext cx="547186" cy="516613"/>
+            </a:xfrm>
+            <a:prstGeom prst="rect">
+              <a:avLst/>
+            </a:prstGeom>
+            <a:solidFill>
+              <a:srgbClr val="FFFFFF"/>
+            </a:solidFill>
+            <a:ln>
+              <a:solidFill>
+                <a:srgbClr val="000000"/>
+              </a:solidFill>
+            </a:ln>
+          </p:spPr>
+          <p:style>
+            <a:lnRef idx="1">
+              <a:schemeClr val="accent1"/>
+            </a:lnRef>
+            <a:fillRef idx="3">
+              <a:schemeClr val="accent1"/>
+            </a:fillRef>
+            <a:effectRef idx="2">
+              <a:schemeClr val="accent1"/>
+            </a:effectRef>
+            <a:fontRef idx="minor">
+              <a:schemeClr val="lt1"/>
+            </a:fontRef>
+          </p:style>
+          <p:txBody>
+            <a:bodyPr rtlCol="0" anchor="ctr"/>
+            <a:lstStyle/>
+            <a:p>
+              <a:pPr algn="ctr"/>
+              <a:endParaRPr lang="en-US"/>
+            </a:p>
+          </p:txBody>
+        </p:sp>
+        <p:sp>
+          <p:nvSpPr>
+            <p:cNvPr id="13" name="TextBox 12"/>
+            <p:cNvSpPr txBox="1"/>
+            <p:nvPr/>
+          </p:nvSpPr>
+          <p:spPr>
+            <a:xfrm>
+              <a:off x="7355938" y="3136399"/>
+              <a:ext cx="535519" cy="369332"/>
+            </a:xfrm>
+            <a:prstGeom prst="rect">
+              <a:avLst/>
+            </a:prstGeom>
+            <a:noFill/>
+          </p:spPr>
+          <p:txBody>
+            <a:bodyPr wrap="square" rtlCol="0">
+              <a:spAutoFit/>
+            </a:bodyPr>
+            <a:lstStyle/>
+            <a:p>
+              <a:r>
+                <a:rPr lang="en-US" dirty="0" smtClean="0"/>
+                <a:t>Toilet</a:t>
+              </a:r>
+              <a:endParaRPr lang="en-US" dirty="0"/>
+            </a:p>
+          </p:txBody>
+        </p:sp>
+      </p:grpSp>
+      <p:sp>
+        <p:nvSpPr>
+          <p:cNvPr id="66" name="TextBox 65"/>
+          <p:cNvSpPr txBox="1"/>
+          <p:nvPr/>
+        </p:nvSpPr>
+        <p:spPr>
+          <a:xfrm>
+            <a:off x="2319326" y="504883"/>
+            <a:ext cx="3908557" cy="369332"/>
+          </a:xfrm>
+          <a:prstGeom prst="rect">
+            <a:avLst/>
+          </a:prstGeom>
+          <a:noFill/>
+        </p:spPr>
+        <p:txBody>
+          <a:bodyPr wrap="square" rtlCol="0">
+            <a:spAutoFit/>
+          </a:bodyPr>
+          <a:lstStyle/>
+          <a:p>
+            <a:r>
+              <a:rPr lang="en-US" dirty="0" smtClean="0"/>
+              <a:t>Level 2</a:t>
+            </a:r>
+            <a:endParaRPr lang="en-US" dirty="0"/>
+          </a:p>
+        </p:txBody>
+      </p:sp>
+      <p:grpSp>
+        <p:nvGrpSpPr>
+          <p:cNvPr id="67" name="Group 66"/>
+          <p:cNvGrpSpPr/>
+          <p:nvPr/>
+        </p:nvGrpSpPr>
+        <p:grpSpPr>
+          <a:xfrm>
+            <a:off x="963934" y="2167734"/>
+            <a:ext cx="715395" cy="2360917"/>
+            <a:chOff x="7344271" y="3149643"/>
+            <a:chExt cx="547186" cy="516613"/>
+          </a:xfrm>
+        </p:grpSpPr>
+        <p:sp>
+          <p:nvSpPr>
+            <p:cNvPr id="68" name="Rectangle 67"/>
+            <p:cNvSpPr/>
+            <p:nvPr/>
+          </p:nvSpPr>
+          <p:spPr>
+            <a:xfrm>
+              <a:off x="7344271" y="3149643"/>
+              <a:ext cx="547186" cy="516613"/>
+            </a:xfrm>
+            <a:prstGeom prst="rect">
+              <a:avLst/>
+            </a:prstGeom>
+            <a:solidFill>
+              <a:srgbClr val="FFFFFF"/>
+            </a:solidFill>
+            <a:ln>
+              <a:solidFill>
+                <a:srgbClr val="000000"/>
+              </a:solidFill>
+            </a:ln>
+          </p:spPr>
+          <p:style>
+            <a:lnRef idx="1">
+              <a:schemeClr val="accent1"/>
+            </a:lnRef>
+            <a:fillRef idx="3">
+              <a:schemeClr val="accent1"/>
+            </a:fillRef>
+            <a:effectRef idx="2">
+              <a:schemeClr val="accent1"/>
+            </a:effectRef>
+            <a:fontRef idx="minor">
+              <a:schemeClr val="lt1"/>
+            </a:fontRef>
+          </p:style>
+          <p:txBody>
+            <a:bodyPr rtlCol="0" anchor="ctr"/>
+            <a:lstStyle/>
+            <a:p>
+              <a:pPr algn="ctr"/>
+              <a:endParaRPr lang="en-US"/>
+            </a:p>
+          </p:txBody>
+        </p:sp>
+        <p:sp>
+          <p:nvSpPr>
+            <p:cNvPr id="69" name="TextBox 68"/>
+            <p:cNvSpPr txBox="1"/>
+            <p:nvPr/>
+          </p:nvSpPr>
+          <p:spPr>
+            <a:xfrm>
+              <a:off x="7517298" y="3222446"/>
+              <a:ext cx="261922" cy="342191"/>
+            </a:xfrm>
+            <a:prstGeom prst="rect">
+              <a:avLst/>
+            </a:prstGeom>
+            <a:noFill/>
+          </p:spPr>
+          <p:txBody>
+            <a:bodyPr wrap="square" rtlCol="0">
+              <a:spAutoFit/>
+            </a:bodyPr>
+            <a:lstStyle/>
+            <a:p>
+              <a:r>
+                <a:rPr lang="en-US" dirty="0" smtClean="0"/>
+                <a:t>1</a:t>
+              </a:r>
+              <a:endParaRPr lang="en-US" dirty="0"/>
+            </a:p>
+          </p:txBody>
+        </p:sp>
+      </p:grpSp>
+      <p:grpSp>
+        <p:nvGrpSpPr>
+          <p:cNvPr id="70" name="Group 69"/>
+          <p:cNvGrpSpPr/>
+          <p:nvPr/>
+        </p:nvGrpSpPr>
+        <p:grpSpPr>
+          <a:xfrm>
+            <a:off x="2001214" y="2968103"/>
+            <a:ext cx="508079" cy="1560548"/>
+            <a:chOff x="7344271" y="3149643"/>
+            <a:chExt cx="547186" cy="516613"/>
+          </a:xfrm>
+        </p:grpSpPr>
+        <p:sp>
+          <p:nvSpPr>
+            <p:cNvPr id="71" name="Rectangle 70"/>
+            <p:cNvSpPr/>
+            <p:nvPr/>
+          </p:nvSpPr>
+          <p:spPr>
+            <a:xfrm>
+              <a:off x="7344271" y="3149643"/>
+              <a:ext cx="547186" cy="516613"/>
+            </a:xfrm>
+            <a:prstGeom prst="rect">
+              <a:avLst/>
+            </a:prstGeom>
+            <a:solidFill>
+              <a:srgbClr val="FFFFFF"/>
+            </a:solidFill>
+            <a:ln>
+              <a:solidFill>
+                <a:srgbClr val="000000"/>
+              </a:solidFill>
+            </a:ln>
+          </p:spPr>
+          <p:style>
+            <a:lnRef idx="1">
+              <a:schemeClr val="accent1"/>
+            </a:lnRef>
+            <a:fillRef idx="3">
+              <a:schemeClr val="accent1"/>
+            </a:fillRef>
+            <a:effectRef idx="2">
+              <a:schemeClr val="accent1"/>
+            </a:effectRef>
+            <a:fontRef idx="minor">
+              <a:schemeClr val="lt1"/>
+            </a:fontRef>
+          </p:style>
+          <p:txBody>
+            <a:bodyPr rtlCol="0" anchor="ctr"/>
+            <a:lstStyle/>
+            <a:p>
+              <a:pPr algn="ctr"/>
+              <a:endParaRPr lang="en-US"/>
+            </a:p>
+          </p:txBody>
+        </p:sp>
+        <p:sp>
+          <p:nvSpPr>
+            <p:cNvPr id="72" name="TextBox 71"/>
+            <p:cNvSpPr txBox="1"/>
+            <p:nvPr/>
+          </p:nvSpPr>
+          <p:spPr>
+            <a:xfrm>
+              <a:off x="7517298" y="3222446"/>
+              <a:ext cx="261922" cy="143733"/>
+            </a:xfrm>
+            <a:prstGeom prst="rect">
+              <a:avLst/>
+            </a:prstGeom>
+            <a:noFill/>
+          </p:spPr>
+          <p:txBody>
+            <a:bodyPr wrap="square" rtlCol="0">
+              <a:spAutoFit/>
+            </a:bodyPr>
+            <a:lstStyle/>
+            <a:p>
+              <a:r>
+                <a:rPr lang="en-US" dirty="0"/>
+                <a:t>2</a:t>
+              </a:r>
+              <a:endParaRPr lang="en-US" dirty="0"/>
+            </a:p>
+          </p:txBody>
+        </p:sp>
+      </p:grpSp>
+      <p:grpSp>
+        <p:nvGrpSpPr>
+          <p:cNvPr id="2" name="Group 1"/>
+          <p:cNvGrpSpPr/>
+          <p:nvPr/>
+        </p:nvGrpSpPr>
+        <p:grpSpPr>
+          <a:xfrm rot="19146133">
+            <a:off x="2879546" y="3006717"/>
+            <a:ext cx="978348" cy="732147"/>
+            <a:chOff x="2716373" y="3601906"/>
+            <a:chExt cx="1200576" cy="508080"/>
+          </a:xfrm>
+        </p:grpSpPr>
+        <p:sp>
+          <p:nvSpPr>
+            <p:cNvPr id="74" name="Rectangle 73"/>
+            <p:cNvSpPr/>
+            <p:nvPr/>
+          </p:nvSpPr>
+          <p:spPr>
+            <a:xfrm rot="16200000">
+              <a:off x="3062621" y="3255658"/>
+              <a:ext cx="508080" cy="1200576"/>
+            </a:xfrm>
+            <a:prstGeom prst="rect">
+              <a:avLst/>
+            </a:prstGeom>
+            <a:solidFill>
+              <a:srgbClr val="FFFFFF"/>
+            </a:solidFill>
+            <a:ln>
+              <a:solidFill>
+                <a:srgbClr val="000000"/>
+              </a:solidFill>
+            </a:ln>
+          </p:spPr>
+          <p:style>
+            <a:lnRef idx="1">
+              <a:schemeClr val="accent1"/>
+            </a:lnRef>
+            <a:fillRef idx="3">
+              <a:schemeClr val="accent1"/>
+            </a:fillRef>
+            <a:effectRef idx="2">
+              <a:schemeClr val="accent1"/>
+            </a:effectRef>
+            <a:fontRef idx="minor">
+              <a:schemeClr val="lt1"/>
+            </a:fontRef>
+          </p:style>
+          <p:txBody>
+            <a:bodyPr rtlCol="0" anchor="ctr"/>
+            <a:lstStyle/>
+            <a:p>
+              <a:pPr algn="ctr"/>
+              <a:endParaRPr lang="en-US"/>
+            </a:p>
+          </p:txBody>
+        </p:sp>
+        <p:sp>
+          <p:nvSpPr>
+            <p:cNvPr id="76" name="TextBox 75"/>
+            <p:cNvSpPr txBox="1"/>
+            <p:nvPr/>
+          </p:nvSpPr>
+          <p:spPr>
+            <a:xfrm>
+              <a:off x="2823084" y="3641460"/>
+              <a:ext cx="243203" cy="369332"/>
+            </a:xfrm>
+            <a:prstGeom prst="rect">
+              <a:avLst/>
+            </a:prstGeom>
+            <a:noFill/>
+          </p:spPr>
+          <p:txBody>
+            <a:bodyPr wrap="square" rtlCol="0">
+              <a:spAutoFit/>
+            </a:bodyPr>
+            <a:lstStyle/>
+            <a:p>
+              <a:r>
+                <a:rPr lang="en-US" dirty="0" smtClean="0"/>
+                <a:t>3</a:t>
+              </a:r>
+              <a:endParaRPr lang="en-US" dirty="0"/>
+            </a:p>
+          </p:txBody>
+        </p:sp>
+      </p:grpSp>
+      <p:grpSp>
+        <p:nvGrpSpPr>
+          <p:cNvPr id="77" name="Group 76"/>
+          <p:cNvGrpSpPr/>
+          <p:nvPr/>
+        </p:nvGrpSpPr>
+        <p:grpSpPr>
+          <a:xfrm>
+            <a:off x="2197601" y="2071853"/>
+            <a:ext cx="1037543" cy="703962"/>
+            <a:chOff x="7344271" y="3078768"/>
+            <a:chExt cx="654291" cy="703962"/>
+          </a:xfrm>
+        </p:grpSpPr>
+        <p:sp>
+          <p:nvSpPr>
+            <p:cNvPr id="78" name="Rectangle 77"/>
+            <p:cNvSpPr/>
+            <p:nvPr/>
+          </p:nvSpPr>
+          <p:spPr>
+            <a:xfrm>
+              <a:off x="7344271" y="3078768"/>
+              <a:ext cx="547186" cy="516613"/>
+            </a:xfrm>
+            <a:prstGeom prst="rect">
+              <a:avLst/>
+            </a:prstGeom>
+            <a:solidFill>
+              <a:srgbClr val="FFFFFF"/>
+            </a:solidFill>
+            <a:ln>
+              <a:solidFill>
+                <a:srgbClr val="000000"/>
+              </a:solidFill>
+            </a:ln>
+          </p:spPr>
+          <p:style>
+            <a:lnRef idx="1">
+              <a:schemeClr val="accent1"/>
+            </a:lnRef>
+            <a:fillRef idx="3">
+              <a:schemeClr val="accent1"/>
+            </a:fillRef>
+            <a:effectRef idx="2">
+              <a:schemeClr val="accent1"/>
+            </a:effectRef>
+            <a:fontRef idx="minor">
+              <a:schemeClr val="lt1"/>
+            </a:fontRef>
+          </p:style>
+          <p:txBody>
+            <a:bodyPr rtlCol="0" anchor="ctr"/>
+            <a:lstStyle/>
+            <a:p>
+              <a:pPr algn="ctr"/>
+              <a:endParaRPr lang="en-US"/>
+            </a:p>
+          </p:txBody>
+        </p:sp>
+        <p:sp>
+          <p:nvSpPr>
+            <p:cNvPr id="79" name="TextBox 78"/>
+            <p:cNvSpPr txBox="1"/>
+            <p:nvPr/>
+          </p:nvSpPr>
+          <p:spPr>
+            <a:xfrm>
+              <a:off x="7355938" y="3136399"/>
+              <a:ext cx="642624" cy="646331"/>
+            </a:xfrm>
+            <a:prstGeom prst="rect">
+              <a:avLst/>
+            </a:prstGeom>
+            <a:noFill/>
+          </p:spPr>
+          <p:txBody>
+            <a:bodyPr wrap="square" rtlCol="0">
+              <a:spAutoFit/>
+            </a:bodyPr>
+            <a:lstStyle/>
+            <a:p>
+              <a:r>
+                <a:rPr lang="en-US" dirty="0" smtClean="0"/>
+                <a:t>stairs</a:t>
+              </a:r>
+              <a:endParaRPr lang="en-US" dirty="0"/>
+            </a:p>
+          </p:txBody>
+        </p:sp>
+      </p:grpSp>
+      <p:grpSp>
+        <p:nvGrpSpPr>
+          <p:cNvPr id="83" name="Group 82"/>
+          <p:cNvGrpSpPr/>
+          <p:nvPr/>
+        </p:nvGrpSpPr>
+        <p:grpSpPr>
+          <a:xfrm>
+            <a:off x="2706297" y="4182478"/>
+            <a:ext cx="654291" cy="516613"/>
+            <a:chOff x="7344271" y="3078768"/>
+            <a:chExt cx="654291" cy="516613"/>
+          </a:xfrm>
+        </p:grpSpPr>
+        <p:sp>
+          <p:nvSpPr>
+            <p:cNvPr id="84" name="Rectangle 83"/>
+            <p:cNvSpPr/>
+            <p:nvPr/>
+          </p:nvSpPr>
+          <p:spPr>
+            <a:xfrm>
+              <a:off x="7344271" y="3078768"/>
+              <a:ext cx="547186" cy="516613"/>
+            </a:xfrm>
+            <a:prstGeom prst="rect">
+              <a:avLst/>
+            </a:prstGeom>
+            <a:solidFill>
+              <a:srgbClr val="FFFFFF"/>
+            </a:solidFill>
+            <a:ln>
+              <a:solidFill>
+                <a:srgbClr val="000000"/>
+              </a:solidFill>
+            </a:ln>
+          </p:spPr>
+          <p:style>
+            <a:lnRef idx="1">
+              <a:schemeClr val="accent1"/>
+            </a:lnRef>
+            <a:fillRef idx="3">
+              <a:schemeClr val="accent1"/>
+            </a:fillRef>
+            <a:effectRef idx="2">
+              <a:schemeClr val="accent1"/>
+            </a:effectRef>
+            <a:fontRef idx="minor">
+              <a:schemeClr val="lt1"/>
+            </a:fontRef>
+          </p:style>
+          <p:txBody>
+            <a:bodyPr rtlCol="0" anchor="ctr"/>
+            <a:lstStyle/>
+            <a:p>
+              <a:pPr algn="ctr"/>
+              <a:endParaRPr lang="en-US"/>
+            </a:p>
+          </p:txBody>
+        </p:sp>
+        <p:sp>
+          <p:nvSpPr>
+            <p:cNvPr id="85" name="TextBox 84"/>
+            <p:cNvSpPr txBox="1"/>
+            <p:nvPr/>
+          </p:nvSpPr>
+          <p:spPr>
+            <a:xfrm>
+              <a:off x="7355938" y="3136399"/>
+              <a:ext cx="642624" cy="369332"/>
+            </a:xfrm>
+            <a:prstGeom prst="rect">
+              <a:avLst/>
+            </a:prstGeom>
+            <a:noFill/>
+          </p:spPr>
+          <p:txBody>
+            <a:bodyPr wrap="square" rtlCol="0">
+              <a:spAutoFit/>
+            </a:bodyPr>
+            <a:lstStyle/>
+            <a:p>
+              <a:r>
+                <a:rPr lang="en-US" dirty="0" smtClean="0"/>
+                <a:t>4</a:t>
+              </a:r>
+              <a:endParaRPr lang="en-US" dirty="0"/>
+            </a:p>
+          </p:txBody>
+        </p:sp>
+      </p:grpSp>
+      <p:grpSp>
+        <p:nvGrpSpPr>
+          <p:cNvPr id="86" name="Group 85"/>
+          <p:cNvGrpSpPr/>
+          <p:nvPr/>
+        </p:nvGrpSpPr>
+        <p:grpSpPr>
+          <a:xfrm>
+            <a:off x="3466290" y="4202898"/>
+            <a:ext cx="1173059" cy="516613"/>
+            <a:chOff x="7344271" y="3078768"/>
+            <a:chExt cx="654291" cy="516613"/>
+          </a:xfrm>
+        </p:grpSpPr>
+        <p:sp>
+          <p:nvSpPr>
+            <p:cNvPr id="87" name="Rectangle 86"/>
+            <p:cNvSpPr/>
+            <p:nvPr/>
+          </p:nvSpPr>
+          <p:spPr>
+            <a:xfrm>
+              <a:off x="7344271" y="3078768"/>
+              <a:ext cx="547186" cy="516613"/>
+            </a:xfrm>
+            <a:prstGeom prst="rect">
+              <a:avLst/>
+            </a:prstGeom>
+            <a:solidFill>
+              <a:srgbClr val="FFFFFF"/>
+            </a:solidFill>
+            <a:ln>
+              <a:solidFill>
+                <a:srgbClr val="000000"/>
+              </a:solidFill>
+            </a:ln>
+          </p:spPr>
+          <p:style>
+            <a:lnRef idx="1">
+              <a:schemeClr val="accent1"/>
+            </a:lnRef>
+            <a:fillRef idx="3">
+              <a:schemeClr val="accent1"/>
+            </a:fillRef>
+            <a:effectRef idx="2">
+              <a:schemeClr val="accent1"/>
+            </a:effectRef>
+            <a:fontRef idx="minor">
+              <a:schemeClr val="lt1"/>
+            </a:fontRef>
+          </p:style>
+          <p:txBody>
+            <a:bodyPr rtlCol="0" anchor="ctr"/>
+            <a:lstStyle/>
+            <a:p>
+              <a:pPr algn="ctr"/>
+              <a:endParaRPr lang="en-US"/>
+            </a:p>
+          </p:txBody>
+        </p:sp>
+        <p:sp>
+          <p:nvSpPr>
+            <p:cNvPr id="88" name="TextBox 87"/>
+            <p:cNvSpPr txBox="1"/>
+            <p:nvPr/>
+          </p:nvSpPr>
+          <p:spPr>
+            <a:xfrm>
+              <a:off x="7355938" y="3136399"/>
+              <a:ext cx="642624" cy="369332"/>
+            </a:xfrm>
+            <a:prstGeom prst="rect">
+              <a:avLst/>
+            </a:prstGeom>
+            <a:noFill/>
+          </p:spPr>
+          <p:txBody>
+            <a:bodyPr wrap="square" rtlCol="0">
+              <a:spAutoFit/>
+            </a:bodyPr>
+            <a:lstStyle/>
+            <a:p>
+              <a:r>
+                <a:rPr lang="en-US" dirty="0"/>
+                <a:t>5</a:t>
+              </a:r>
+              <a:endParaRPr lang="en-US" dirty="0"/>
+            </a:p>
+          </p:txBody>
+        </p:sp>
+      </p:grpSp>
+      <p:grpSp>
+        <p:nvGrpSpPr>
+          <p:cNvPr id="89" name="Group 88"/>
+          <p:cNvGrpSpPr/>
+          <p:nvPr/>
+        </p:nvGrpSpPr>
+        <p:grpSpPr>
+          <a:xfrm>
+            <a:off x="4599724" y="4182478"/>
+            <a:ext cx="1173059" cy="516613"/>
+            <a:chOff x="7344271" y="3078768"/>
+            <a:chExt cx="654291" cy="516613"/>
+          </a:xfrm>
+        </p:grpSpPr>
+        <p:sp>
+          <p:nvSpPr>
+            <p:cNvPr id="90" name="Rectangle 89"/>
+            <p:cNvSpPr/>
+            <p:nvPr/>
+          </p:nvSpPr>
+          <p:spPr>
+            <a:xfrm>
+              <a:off x="7344271" y="3078768"/>
+              <a:ext cx="547186" cy="516613"/>
+            </a:xfrm>
+            <a:prstGeom prst="rect">
+              <a:avLst/>
+            </a:prstGeom>
+            <a:solidFill>
+              <a:srgbClr val="FFFFFF"/>
+            </a:solidFill>
+            <a:ln>
+              <a:solidFill>
+                <a:srgbClr val="000000"/>
+              </a:solidFill>
+            </a:ln>
+          </p:spPr>
+          <p:style>
+            <a:lnRef idx="1">
+              <a:schemeClr val="accent1"/>
+            </a:lnRef>
+            <a:fillRef idx="3">
+              <a:schemeClr val="accent1"/>
+            </a:fillRef>
+            <a:effectRef idx="2">
+              <a:schemeClr val="accent1"/>
+            </a:effectRef>
+            <a:fontRef idx="minor">
+              <a:schemeClr val="lt1"/>
+            </a:fontRef>
+          </p:style>
+          <p:txBody>
+            <a:bodyPr rtlCol="0" anchor="ctr"/>
+            <a:lstStyle/>
+            <a:p>
+              <a:pPr algn="ctr"/>
+              <a:endParaRPr lang="en-US"/>
+            </a:p>
+          </p:txBody>
+        </p:sp>
+        <p:sp>
+          <p:nvSpPr>
+            <p:cNvPr id="91" name="TextBox 90"/>
+            <p:cNvSpPr txBox="1"/>
+            <p:nvPr/>
+          </p:nvSpPr>
+          <p:spPr>
+            <a:xfrm>
+              <a:off x="7355938" y="3136399"/>
+              <a:ext cx="642624" cy="369332"/>
+            </a:xfrm>
+            <a:prstGeom prst="rect">
+              <a:avLst/>
+            </a:prstGeom>
+            <a:noFill/>
+          </p:spPr>
+          <p:txBody>
+            <a:bodyPr wrap="square" rtlCol="0">
+              <a:spAutoFit/>
+            </a:bodyPr>
+            <a:lstStyle/>
+            <a:p>
+              <a:r>
+                <a:rPr lang="en-US" dirty="0" smtClean="0"/>
+                <a:t>6</a:t>
+              </a:r>
+              <a:endParaRPr lang="en-US" dirty="0"/>
+            </a:p>
+          </p:txBody>
+        </p:sp>
+      </p:grpSp>
+      <p:grpSp>
+        <p:nvGrpSpPr>
+          <p:cNvPr id="92" name="Group 91"/>
+          <p:cNvGrpSpPr/>
+          <p:nvPr/>
+        </p:nvGrpSpPr>
+        <p:grpSpPr>
+          <a:xfrm>
+            <a:off x="5115430" y="2722783"/>
+            <a:ext cx="2148707" cy="1012163"/>
+            <a:chOff x="7344271" y="3149643"/>
+            <a:chExt cx="547186" cy="516613"/>
+          </a:xfrm>
+        </p:grpSpPr>
+        <p:sp>
+          <p:nvSpPr>
+            <p:cNvPr id="93" name="Rectangle 92"/>
+            <p:cNvSpPr/>
+            <p:nvPr/>
+          </p:nvSpPr>
+          <p:spPr>
+            <a:xfrm>
+              <a:off x="7344271" y="3149643"/>
+              <a:ext cx="547186" cy="516613"/>
+            </a:xfrm>
+            <a:prstGeom prst="rect">
+              <a:avLst/>
+            </a:prstGeom>
+            <a:solidFill>
+              <a:srgbClr val="FFFFFF"/>
+            </a:solidFill>
+            <a:ln>
+              <a:solidFill>
+                <a:srgbClr val="000000"/>
+              </a:solidFill>
+            </a:ln>
+          </p:spPr>
+          <p:style>
+            <a:lnRef idx="1">
+              <a:schemeClr val="accent1"/>
+            </a:lnRef>
+            <a:fillRef idx="3">
+              <a:schemeClr val="accent1"/>
+            </a:fillRef>
+            <a:effectRef idx="2">
+              <a:schemeClr val="accent1"/>
+            </a:effectRef>
+            <a:fontRef idx="minor">
+              <a:schemeClr val="lt1"/>
+            </a:fontRef>
+          </p:style>
+          <p:txBody>
+            <a:bodyPr rtlCol="0" anchor="ctr"/>
+            <a:lstStyle/>
+            <a:p>
+              <a:pPr algn="ctr"/>
+              <a:endParaRPr lang="en-US"/>
+            </a:p>
+          </p:txBody>
+        </p:sp>
+        <p:sp>
+          <p:nvSpPr>
+            <p:cNvPr id="94" name="TextBox 93"/>
+            <p:cNvSpPr txBox="1"/>
+            <p:nvPr/>
+          </p:nvSpPr>
+          <p:spPr>
+            <a:xfrm>
+              <a:off x="7517298" y="3222446"/>
+              <a:ext cx="261922" cy="188509"/>
+            </a:xfrm>
+            <a:prstGeom prst="rect">
+              <a:avLst/>
+            </a:prstGeom>
+            <a:noFill/>
+          </p:spPr>
+          <p:txBody>
+            <a:bodyPr wrap="square" rtlCol="0">
+              <a:spAutoFit/>
+            </a:bodyPr>
+            <a:lstStyle/>
+            <a:p>
+              <a:r>
+                <a:rPr lang="en-US" dirty="0"/>
+                <a:t>7</a:t>
+              </a:r>
+              <a:endParaRPr lang="en-US" dirty="0"/>
+            </a:p>
+          </p:txBody>
+        </p:sp>
+      </p:grpSp>
+      <p:grpSp>
+        <p:nvGrpSpPr>
+          <p:cNvPr id="95" name="Group 94"/>
+          <p:cNvGrpSpPr/>
+          <p:nvPr/>
+        </p:nvGrpSpPr>
+        <p:grpSpPr>
+          <a:xfrm>
+            <a:off x="5925183" y="4182478"/>
+            <a:ext cx="2031111" cy="516613"/>
+            <a:chOff x="7344271" y="3078768"/>
+            <a:chExt cx="654291" cy="516613"/>
+          </a:xfrm>
+        </p:grpSpPr>
+        <p:sp>
+          <p:nvSpPr>
+            <p:cNvPr id="96" name="Rectangle 95"/>
+            <p:cNvSpPr/>
+            <p:nvPr/>
+          </p:nvSpPr>
+          <p:spPr>
+            <a:xfrm>
+              <a:off x="7344271" y="3078768"/>
+              <a:ext cx="547186" cy="516613"/>
+            </a:xfrm>
+            <a:prstGeom prst="rect">
+              <a:avLst/>
+            </a:prstGeom>
+            <a:solidFill>
+              <a:srgbClr val="FFFFFF"/>
+            </a:solidFill>
+            <a:ln>
+              <a:solidFill>
+                <a:srgbClr val="000000"/>
+              </a:solidFill>
+            </a:ln>
+          </p:spPr>
+          <p:style>
+            <a:lnRef idx="1">
+              <a:schemeClr val="accent1"/>
+            </a:lnRef>
+            <a:fillRef idx="3">
+              <a:schemeClr val="accent1"/>
+            </a:fillRef>
+            <a:effectRef idx="2">
+              <a:schemeClr val="accent1"/>
+            </a:effectRef>
+            <a:fontRef idx="minor">
+              <a:schemeClr val="lt1"/>
+            </a:fontRef>
+          </p:style>
+          <p:txBody>
+            <a:bodyPr rtlCol="0" anchor="ctr"/>
+            <a:lstStyle/>
+            <a:p>
+              <a:pPr algn="ctr"/>
+              <a:endParaRPr lang="en-US"/>
+            </a:p>
+          </p:txBody>
+        </p:sp>
+        <p:sp>
+          <p:nvSpPr>
+            <p:cNvPr id="97" name="TextBox 96"/>
+            <p:cNvSpPr txBox="1"/>
+            <p:nvPr/>
+          </p:nvSpPr>
+          <p:spPr>
+            <a:xfrm>
+              <a:off x="7355938" y="3136399"/>
+              <a:ext cx="642624" cy="369332"/>
+            </a:xfrm>
+            <a:prstGeom prst="rect">
+              <a:avLst/>
+            </a:prstGeom>
+            <a:noFill/>
+          </p:spPr>
+          <p:txBody>
+            <a:bodyPr wrap="square" rtlCol="0">
+              <a:spAutoFit/>
+            </a:bodyPr>
+            <a:lstStyle/>
+            <a:p>
+              <a:r>
+                <a:rPr lang="en-US" dirty="0"/>
+                <a:t>8</a:t>
+              </a:r>
+              <a:endParaRPr lang="en-US" dirty="0"/>
+            </a:p>
+          </p:txBody>
+        </p:sp>
+      </p:grpSp>
+      <p:grpSp>
+        <p:nvGrpSpPr>
+          <p:cNvPr id="98" name="Group 97"/>
+          <p:cNvGrpSpPr/>
+          <p:nvPr/>
+        </p:nvGrpSpPr>
+        <p:grpSpPr>
+          <a:xfrm>
+            <a:off x="5115431" y="1909427"/>
+            <a:ext cx="2877082" cy="516613"/>
+            <a:chOff x="7344271" y="3078768"/>
+            <a:chExt cx="654291" cy="516613"/>
+          </a:xfrm>
+        </p:grpSpPr>
+        <p:sp>
+          <p:nvSpPr>
+            <p:cNvPr id="99" name="Rectangle 98"/>
+            <p:cNvSpPr/>
+            <p:nvPr/>
+          </p:nvSpPr>
+          <p:spPr>
+            <a:xfrm>
+              <a:off x="7344271" y="3078768"/>
+              <a:ext cx="547186" cy="516613"/>
+            </a:xfrm>
+            <a:prstGeom prst="rect">
+              <a:avLst/>
+            </a:prstGeom>
+            <a:solidFill>
+              <a:srgbClr val="FFFFFF"/>
+            </a:solidFill>
+            <a:ln>
+              <a:solidFill>
+                <a:srgbClr val="000000"/>
+              </a:solidFill>
+            </a:ln>
+          </p:spPr>
+          <p:style>
+            <a:lnRef idx="1">
+              <a:schemeClr val="accent1"/>
+            </a:lnRef>
+            <a:fillRef idx="3">
+              <a:schemeClr val="accent1"/>
+            </a:fillRef>
+            <a:effectRef idx="2">
+              <a:schemeClr val="accent1"/>
+            </a:effectRef>
+            <a:fontRef idx="minor">
+              <a:schemeClr val="lt1"/>
+            </a:fontRef>
+          </p:style>
+          <p:txBody>
+            <a:bodyPr rtlCol="0" anchor="ctr"/>
+            <a:lstStyle/>
+            <a:p>
+              <a:pPr algn="ctr"/>
+              <a:endParaRPr lang="en-US"/>
+            </a:p>
+          </p:txBody>
+        </p:sp>
+        <p:sp>
+          <p:nvSpPr>
+            <p:cNvPr id="100" name="TextBox 99"/>
+            <p:cNvSpPr txBox="1"/>
+            <p:nvPr/>
+          </p:nvSpPr>
+          <p:spPr>
+            <a:xfrm>
+              <a:off x="7355938" y="3136399"/>
+              <a:ext cx="642624" cy="369332"/>
+            </a:xfrm>
+            <a:prstGeom prst="rect">
+              <a:avLst/>
+            </a:prstGeom>
+            <a:noFill/>
+          </p:spPr>
+          <p:txBody>
+            <a:bodyPr wrap="square" rtlCol="0">
+              <a:spAutoFit/>
+            </a:bodyPr>
+            <a:lstStyle/>
+            <a:p>
+              <a:r>
+                <a:rPr lang="en-US" dirty="0" smtClean="0"/>
+                <a:t>9</a:t>
+              </a:r>
+              <a:endParaRPr lang="en-US" dirty="0"/>
+            </a:p>
+          </p:txBody>
+        </p:sp>
+      </p:grpSp>
+    </p:spTree>
+    <p:extLst>
+      <p:ext uri="{BB962C8B-B14F-4D97-AF65-F5344CB8AC3E}">
+        <p14:creationId xmlns:p14="http://schemas.microsoft.com/office/powerpoint/2010/main" val="3750967748"/>
       </p:ext>
     </p:extLst>
   </p:cSld>

</xml_diff>